<commit_message>
need to finish project 3 and start secproj-3.
</commit_message>
<xml_diff>
--- a/ISEC690_Sec_proj/assignment_3/ISEC690_Team1_Assignment3.pptx
+++ b/ISEC690_Sec_proj/assignment_3/ISEC690_Team1_Assignment3.pptx
@@ -114,6 +114,11 @@
       </a:defRPr>
     </a:lvl9pPr>
   </p:defaultTextStyle>
+  <p:extLst>
+    <p:ext uri="{EFAFB233-063F-42B5-8137-9DF3F51BA10A}">
+      <p15:sldGuideLst xmlns:p15="http://schemas.microsoft.com/office/powerpoint/2012/main"/>
+    </p:ext>
+  </p:extLst>
 </p:presentation>
 </file>
 
@@ -174,7 +179,7 @@
           <a:noFill/>
           <a:extLst>
             <a:ext uri="{909E8E84-426E-40dd-AFC4-6F175D3DCCD1}">
-              <a14:hiddenFill xmlns:a14="http://schemas.microsoft.com/office/drawing/2010/main" xmlns="">
+              <a14:hiddenFill xmlns="" xmlns:a14="http://schemas.microsoft.com/office/drawing/2010/main">
                 <a:solidFill>
                   <a:srgbClr val="FFFFFF"/>
                 </a:solidFill>
@@ -233,7 +238,7 @@
             </a:ln>
             <a:extLst>
               <a:ext uri="{91240B29-F687-4f45-9708-019B960494DF}">
-                <a14:hiddenLine xmlns:a14="http://schemas.microsoft.com/office/drawing/2010/main" xmlns="" w="9525">
+                <a14:hiddenLine xmlns="" xmlns:a14="http://schemas.microsoft.com/office/drawing/2010/main" w="9525">
                   <a:solidFill>
                     <a:srgbClr val="000000"/>
                   </a:solidFill>
@@ -323,7 +328,7 @@
             </a:ln>
             <a:extLst>
               <a:ext uri="{91240B29-F687-4f45-9708-019B960494DF}">
-                <a14:hiddenLine xmlns:a14="http://schemas.microsoft.com/office/drawing/2010/main" xmlns="" w="9525">
+                <a14:hiddenLine xmlns="" xmlns:a14="http://schemas.microsoft.com/office/drawing/2010/main" w="9525">
                   <a:solidFill>
                     <a:srgbClr val="000000"/>
                   </a:solidFill>
@@ -413,7 +418,7 @@
             </a:ln>
             <a:extLst>
               <a:ext uri="{91240B29-F687-4f45-9708-019B960494DF}">
-                <a14:hiddenLine xmlns:a14="http://schemas.microsoft.com/office/drawing/2010/main" xmlns="" w="9525">
+                <a14:hiddenLine xmlns="" xmlns:a14="http://schemas.microsoft.com/office/drawing/2010/main" w="9525">
                   <a:solidFill>
                     <a:srgbClr val="000000"/>
                   </a:solidFill>
@@ -447,7 +452,7 @@
             </a:ln>
             <a:extLst>
               <a:ext uri="{91240B29-F687-4f45-9708-019B960494DF}">
-                <a14:hiddenLine xmlns:a14="http://schemas.microsoft.com/office/drawing/2010/main" xmlns="" w="9525">
+                <a14:hiddenLine xmlns="" xmlns:a14="http://schemas.microsoft.com/office/drawing/2010/main" w="9525">
                   <a:solidFill>
                     <a:srgbClr val="000000"/>
                   </a:solidFill>
@@ -537,7 +542,7 @@
             </a:ln>
             <a:extLst>
               <a:ext uri="{91240B29-F687-4f45-9708-019B960494DF}">
-                <a14:hiddenLine xmlns:a14="http://schemas.microsoft.com/office/drawing/2010/main" xmlns="" w="9525">
+                <a14:hiddenLine xmlns="" xmlns:a14="http://schemas.microsoft.com/office/drawing/2010/main" w="9525">
                   <a:solidFill>
                     <a:srgbClr val="000000"/>
                   </a:solidFill>
@@ -599,7 +604,7 @@
             </a:ln>
             <a:extLst>
               <a:ext uri="{91240B29-F687-4f45-9708-019B960494DF}">
-                <a14:hiddenLine xmlns:a14="http://schemas.microsoft.com/office/drawing/2010/main" xmlns="" w="9525">
+                <a14:hiddenLine xmlns="" xmlns:a14="http://schemas.microsoft.com/office/drawing/2010/main" w="9525">
                   <a:solidFill>
                     <a:srgbClr val="000000"/>
                   </a:solidFill>
@@ -661,7 +666,7 @@
             </a:ln>
             <a:extLst>
               <a:ext uri="{91240B29-F687-4f45-9708-019B960494DF}">
-                <a14:hiddenLine xmlns:a14="http://schemas.microsoft.com/office/drawing/2010/main" xmlns="" w="9525">
+                <a14:hiddenLine xmlns="" xmlns:a14="http://schemas.microsoft.com/office/drawing/2010/main" w="9525">
                   <a:solidFill>
                     <a:srgbClr val="000000"/>
                   </a:solidFill>
@@ -751,7 +756,7 @@
             </a:ln>
             <a:extLst>
               <a:ext uri="{91240B29-F687-4f45-9708-019B960494DF}">
-                <a14:hiddenLine xmlns:a14="http://schemas.microsoft.com/office/drawing/2010/main" xmlns="" w="9525">
+                <a14:hiddenLine xmlns="" xmlns:a14="http://schemas.microsoft.com/office/drawing/2010/main" w="9525">
                   <a:solidFill>
                     <a:srgbClr val="000000"/>
                   </a:solidFill>
@@ -813,7 +818,7 @@
             </a:ln>
             <a:extLst>
               <a:ext uri="{91240B29-F687-4f45-9708-019B960494DF}">
-                <a14:hiddenLine xmlns:a14="http://schemas.microsoft.com/office/drawing/2010/main" xmlns="" w="9525">
+                <a14:hiddenLine xmlns="" xmlns:a14="http://schemas.microsoft.com/office/drawing/2010/main" w="9525">
                   <a:solidFill>
                     <a:srgbClr val="000000"/>
                   </a:solidFill>
@@ -875,7 +880,7 @@
             </a:ln>
             <a:extLst>
               <a:ext uri="{91240B29-F687-4f45-9708-019B960494DF}">
-                <a14:hiddenLine xmlns:a14="http://schemas.microsoft.com/office/drawing/2010/main" xmlns="" w="9525">
+                <a14:hiddenLine xmlns="" xmlns:a14="http://schemas.microsoft.com/office/drawing/2010/main" w="9525">
                   <a:solidFill>
                     <a:srgbClr val="000000"/>
                   </a:solidFill>
@@ -965,7 +970,7 @@
             </a:ln>
             <a:extLst>
               <a:ext uri="{91240B29-F687-4f45-9708-019B960494DF}">
-                <a14:hiddenLine xmlns:a14="http://schemas.microsoft.com/office/drawing/2010/main" xmlns="" w="9525">
+                <a14:hiddenLine xmlns="" xmlns:a14="http://schemas.microsoft.com/office/drawing/2010/main" w="9525">
                   <a:solidFill>
                     <a:srgbClr val="000000"/>
                   </a:solidFill>
@@ -1055,7 +1060,7 @@
             </a:ln>
             <a:extLst>
               <a:ext uri="{91240B29-F687-4f45-9708-019B960494DF}">
-                <a14:hiddenLine xmlns:a14="http://schemas.microsoft.com/office/drawing/2010/main" xmlns="" w="9525">
+                <a14:hiddenLine xmlns="" xmlns:a14="http://schemas.microsoft.com/office/drawing/2010/main" w="9525">
                   <a:solidFill>
                     <a:srgbClr val="000000"/>
                   </a:solidFill>
@@ -1117,7 +1122,7 @@
             </a:ln>
             <a:extLst>
               <a:ext uri="{91240B29-F687-4f45-9708-019B960494DF}">
-                <a14:hiddenLine xmlns:a14="http://schemas.microsoft.com/office/drawing/2010/main" xmlns="" w="9525">
+                <a14:hiddenLine xmlns="" xmlns:a14="http://schemas.microsoft.com/office/drawing/2010/main" w="9525">
                   <a:solidFill>
                     <a:srgbClr val="000000"/>
                   </a:solidFill>
@@ -1227,7 +1232,7 @@
             </a:ln>
             <a:extLst>
               <a:ext uri="{91240B29-F687-4f45-9708-019B960494DF}">
-                <a14:hiddenLine xmlns:a14="http://schemas.microsoft.com/office/drawing/2010/main" xmlns="" w="9525">
+                <a14:hiddenLine xmlns="" xmlns:a14="http://schemas.microsoft.com/office/drawing/2010/main" w="9525">
                   <a:solidFill>
                     <a:srgbClr val="000000"/>
                   </a:solidFill>
@@ -1289,7 +1294,7 @@
             </a:ln>
             <a:extLst>
               <a:ext uri="{91240B29-F687-4f45-9708-019B960494DF}">
-                <a14:hiddenLine xmlns:a14="http://schemas.microsoft.com/office/drawing/2010/main" xmlns="" w="9525">
+                <a14:hiddenLine xmlns="" xmlns:a14="http://schemas.microsoft.com/office/drawing/2010/main" w="9525">
                   <a:solidFill>
                     <a:srgbClr val="000000"/>
                   </a:solidFill>
@@ -1379,7 +1384,7 @@
             </a:ln>
             <a:extLst>
               <a:ext uri="{91240B29-F687-4f45-9708-019B960494DF}">
-                <a14:hiddenLine xmlns:a14="http://schemas.microsoft.com/office/drawing/2010/main" xmlns="" w="9525">
+                <a14:hiddenLine xmlns="" xmlns:a14="http://schemas.microsoft.com/office/drawing/2010/main" w="9525">
                   <a:solidFill>
                     <a:srgbClr val="000000"/>
                   </a:solidFill>
@@ -1469,7 +1474,7 @@
             </a:ln>
             <a:extLst>
               <a:ext uri="{91240B29-F687-4f45-9708-019B960494DF}">
-                <a14:hiddenLine xmlns:a14="http://schemas.microsoft.com/office/drawing/2010/main" xmlns="" w="9525">
+                <a14:hiddenLine xmlns="" xmlns:a14="http://schemas.microsoft.com/office/drawing/2010/main" w="9525">
                   <a:solidFill>
                     <a:srgbClr val="000000"/>
                   </a:solidFill>
@@ -1531,7 +1536,7 @@
             </a:ln>
             <a:extLst>
               <a:ext uri="{91240B29-F687-4f45-9708-019B960494DF}">
-                <a14:hiddenLine xmlns:a14="http://schemas.microsoft.com/office/drawing/2010/main" xmlns="" w="9525">
+                <a14:hiddenLine xmlns="" xmlns:a14="http://schemas.microsoft.com/office/drawing/2010/main" w="9525">
                   <a:solidFill>
                     <a:srgbClr val="000000"/>
                   </a:solidFill>
@@ -1621,7 +1626,7 @@
             </a:ln>
             <a:extLst>
               <a:ext uri="{91240B29-F687-4f45-9708-019B960494DF}">
-                <a14:hiddenLine xmlns:a14="http://schemas.microsoft.com/office/drawing/2010/main" xmlns="" w="9525">
+                <a14:hiddenLine xmlns="" xmlns:a14="http://schemas.microsoft.com/office/drawing/2010/main" w="9525">
                   <a:solidFill>
                     <a:srgbClr val="000000"/>
                   </a:solidFill>
@@ -1711,7 +1716,7 @@
             </a:ln>
             <a:extLst>
               <a:ext uri="{91240B29-F687-4f45-9708-019B960494DF}">
-                <a14:hiddenLine xmlns:a14="http://schemas.microsoft.com/office/drawing/2010/main" xmlns="" w="9525">
+                <a14:hiddenLine xmlns="" xmlns:a14="http://schemas.microsoft.com/office/drawing/2010/main" w="9525">
                   <a:solidFill>
                     <a:srgbClr val="000000"/>
                   </a:solidFill>
@@ -1767,7 +1772,7 @@
             </a:ln>
             <a:extLst>
               <a:ext uri="{91240B29-F687-4f45-9708-019B960494DF}">
-                <a14:hiddenLine xmlns:a14="http://schemas.microsoft.com/office/drawing/2010/main" xmlns="" w="9525">
+                <a14:hiddenLine xmlns="" xmlns:a14="http://schemas.microsoft.com/office/drawing/2010/main" w="9525">
                   <a:solidFill>
                     <a:srgbClr val="000000"/>
                   </a:solidFill>
@@ -1857,7 +1862,7 @@
             </a:ln>
             <a:extLst>
               <a:ext uri="{91240B29-F687-4f45-9708-019B960494DF}">
-                <a14:hiddenLine xmlns:a14="http://schemas.microsoft.com/office/drawing/2010/main" xmlns="" w="9525">
+                <a14:hiddenLine xmlns="" xmlns:a14="http://schemas.microsoft.com/office/drawing/2010/main" w="9525">
                   <a:solidFill>
                     <a:srgbClr val="000000"/>
                   </a:solidFill>
@@ -1913,7 +1918,7 @@
             </a:ln>
             <a:extLst>
               <a:ext uri="{91240B29-F687-4f45-9708-019B960494DF}">
-                <a14:hiddenLine xmlns:a14="http://schemas.microsoft.com/office/drawing/2010/main" xmlns="" w="9525">
+                <a14:hiddenLine xmlns="" xmlns:a14="http://schemas.microsoft.com/office/drawing/2010/main" w="9525">
                   <a:solidFill>
                     <a:srgbClr val="000000"/>
                   </a:solidFill>
@@ -2003,7 +2008,7 @@
             </a:ln>
             <a:extLst>
               <a:ext uri="{91240B29-F687-4f45-9708-019B960494DF}">
-                <a14:hiddenLine xmlns:a14="http://schemas.microsoft.com/office/drawing/2010/main" xmlns="" w="9525">
+                <a14:hiddenLine xmlns="" xmlns:a14="http://schemas.microsoft.com/office/drawing/2010/main" w="9525">
                   <a:solidFill>
                     <a:srgbClr val="000000"/>
                   </a:solidFill>
@@ -2071,7 +2076,7 @@
             </a:ln>
             <a:extLst>
               <a:ext uri="{91240B29-F687-4f45-9708-019B960494DF}">
-                <a14:hiddenLine xmlns:a14="http://schemas.microsoft.com/office/drawing/2010/main" xmlns="" w="9525">
+                <a14:hiddenLine xmlns="" xmlns:a14="http://schemas.microsoft.com/office/drawing/2010/main" w="9525">
                   <a:solidFill>
                     <a:srgbClr val="000000"/>
                   </a:solidFill>
@@ -2161,7 +2166,7 @@
             </a:ln>
             <a:extLst>
               <a:ext uri="{91240B29-F687-4f45-9708-019B960494DF}">
-                <a14:hiddenLine xmlns:a14="http://schemas.microsoft.com/office/drawing/2010/main" xmlns="" w="9525">
+                <a14:hiddenLine xmlns="" xmlns:a14="http://schemas.microsoft.com/office/drawing/2010/main" w="9525">
                   <a:solidFill>
                     <a:srgbClr val="000000"/>
                   </a:solidFill>
@@ -2229,7 +2234,7 @@
             </a:ln>
             <a:extLst>
               <a:ext uri="{91240B29-F687-4f45-9708-019B960494DF}">
-                <a14:hiddenLine xmlns:a14="http://schemas.microsoft.com/office/drawing/2010/main" xmlns="" w="9525">
+                <a14:hiddenLine xmlns="" xmlns:a14="http://schemas.microsoft.com/office/drawing/2010/main" w="9525">
                   <a:solidFill>
                     <a:srgbClr val="000000"/>
                   </a:solidFill>
@@ -2319,7 +2324,7 @@
             </a:ln>
             <a:extLst>
               <a:ext uri="{91240B29-F687-4f45-9708-019B960494DF}">
-                <a14:hiddenLine xmlns:a14="http://schemas.microsoft.com/office/drawing/2010/main" xmlns="" w="9525">
+                <a14:hiddenLine xmlns="" xmlns:a14="http://schemas.microsoft.com/office/drawing/2010/main" w="9525">
                   <a:solidFill>
                     <a:srgbClr val="000000"/>
                   </a:solidFill>
@@ -2353,7 +2358,7 @@
             </a:ln>
             <a:extLst>
               <a:ext uri="{91240B29-F687-4f45-9708-019B960494DF}">
-                <a14:hiddenLine xmlns:a14="http://schemas.microsoft.com/office/drawing/2010/main" xmlns="" w="9525">
+                <a14:hiddenLine xmlns="" xmlns:a14="http://schemas.microsoft.com/office/drawing/2010/main" w="9525">
                   <a:solidFill>
                     <a:srgbClr val="000000"/>
                   </a:solidFill>
@@ -2443,7 +2448,7 @@
             </a:ln>
             <a:extLst>
               <a:ext uri="{91240B29-F687-4f45-9708-019B960494DF}">
-                <a14:hiddenLine xmlns:a14="http://schemas.microsoft.com/office/drawing/2010/main" xmlns="" w="9525">
+                <a14:hiddenLine xmlns="" xmlns:a14="http://schemas.microsoft.com/office/drawing/2010/main" w="9525">
                   <a:solidFill>
                     <a:srgbClr val="000000"/>
                   </a:solidFill>
@@ -2505,7 +2510,7 @@
             </a:ln>
             <a:extLst>
               <a:ext uri="{91240B29-F687-4f45-9708-019B960494DF}">
-                <a14:hiddenLine xmlns:a14="http://schemas.microsoft.com/office/drawing/2010/main" xmlns="" w="9525">
+                <a14:hiddenLine xmlns="" xmlns:a14="http://schemas.microsoft.com/office/drawing/2010/main" w="9525">
                   <a:solidFill>
                     <a:srgbClr val="000000"/>
                   </a:solidFill>
@@ -2567,7 +2572,7 @@
             </a:ln>
             <a:extLst>
               <a:ext uri="{91240B29-F687-4f45-9708-019B960494DF}">
-                <a14:hiddenLine xmlns:a14="http://schemas.microsoft.com/office/drawing/2010/main" xmlns="" w="9525">
+                <a14:hiddenLine xmlns="" xmlns:a14="http://schemas.microsoft.com/office/drawing/2010/main" w="9525">
                   <a:solidFill>
                     <a:srgbClr val="000000"/>
                   </a:solidFill>
@@ -2657,7 +2662,7 @@
             </a:ln>
             <a:extLst>
               <a:ext uri="{91240B29-F687-4f45-9708-019B960494DF}">
-                <a14:hiddenLine xmlns:a14="http://schemas.microsoft.com/office/drawing/2010/main" xmlns="" w="9525">
+                <a14:hiddenLine xmlns="" xmlns:a14="http://schemas.microsoft.com/office/drawing/2010/main" w="9525">
                   <a:solidFill>
                     <a:srgbClr val="000000"/>
                   </a:solidFill>
@@ -2725,7 +2730,7 @@
             </a:ln>
             <a:extLst>
               <a:ext uri="{91240B29-F687-4f45-9708-019B960494DF}">
-                <a14:hiddenLine xmlns:a14="http://schemas.microsoft.com/office/drawing/2010/main" xmlns="" w="9525">
+                <a14:hiddenLine xmlns="" xmlns:a14="http://schemas.microsoft.com/office/drawing/2010/main" w="9525">
                   <a:solidFill>
                     <a:srgbClr val="000000"/>
                   </a:solidFill>
@@ -2787,7 +2792,7 @@
             </a:ln>
             <a:extLst>
               <a:ext uri="{91240B29-F687-4f45-9708-019B960494DF}">
-                <a14:hiddenLine xmlns:a14="http://schemas.microsoft.com/office/drawing/2010/main" xmlns="" w="9525">
+                <a14:hiddenLine xmlns="" xmlns:a14="http://schemas.microsoft.com/office/drawing/2010/main" w="9525">
                   <a:solidFill>
                     <a:srgbClr val="000000"/>
                   </a:solidFill>
@@ -2877,7 +2882,7 @@
             </a:ln>
             <a:extLst>
               <a:ext uri="{91240B29-F687-4f45-9708-019B960494DF}">
-                <a14:hiddenLine xmlns:a14="http://schemas.microsoft.com/office/drawing/2010/main" xmlns="" w="9525">
+                <a14:hiddenLine xmlns="" xmlns:a14="http://schemas.microsoft.com/office/drawing/2010/main" w="9525">
                   <a:solidFill>
                     <a:srgbClr val="000000"/>
                   </a:solidFill>
@@ -2939,7 +2944,7 @@
             </a:ln>
             <a:extLst>
               <a:ext uri="{91240B29-F687-4f45-9708-019B960494DF}">
-                <a14:hiddenLine xmlns:a14="http://schemas.microsoft.com/office/drawing/2010/main" xmlns="" w="9525">
+                <a14:hiddenLine xmlns="" xmlns:a14="http://schemas.microsoft.com/office/drawing/2010/main" w="9525">
                   <a:solidFill>
                     <a:srgbClr val="000000"/>
                   </a:solidFill>
@@ -3029,7 +3034,7 @@
             </a:ln>
             <a:extLst>
               <a:ext uri="{91240B29-F687-4f45-9708-019B960494DF}">
-                <a14:hiddenLine xmlns:a14="http://schemas.microsoft.com/office/drawing/2010/main" xmlns="" w="9525">
+                <a14:hiddenLine xmlns="" xmlns:a14="http://schemas.microsoft.com/office/drawing/2010/main" w="9525">
                   <a:solidFill>
                     <a:srgbClr val="000000"/>
                   </a:solidFill>
@@ -3091,7 +3096,7 @@
             </a:ln>
             <a:extLst>
               <a:ext uri="{91240B29-F687-4f45-9708-019B960494DF}">
-                <a14:hiddenLine xmlns:a14="http://schemas.microsoft.com/office/drawing/2010/main" xmlns="" w="9525">
+                <a14:hiddenLine xmlns="" xmlns:a14="http://schemas.microsoft.com/office/drawing/2010/main" w="9525">
                   <a:solidFill>
                     <a:srgbClr val="000000"/>
                   </a:solidFill>
@@ -3181,7 +3186,7 @@
             </a:ln>
             <a:extLst>
               <a:ext uri="{91240B29-F687-4f45-9708-019B960494DF}">
-                <a14:hiddenLine xmlns:a14="http://schemas.microsoft.com/office/drawing/2010/main" xmlns="" w="9525">
+                <a14:hiddenLine xmlns="" xmlns:a14="http://schemas.microsoft.com/office/drawing/2010/main" w="9525">
                   <a:solidFill>
                     <a:srgbClr val="000000"/>
                   </a:solidFill>
@@ -3215,7 +3220,7 @@
             </a:ln>
             <a:extLst>
               <a:ext uri="{91240B29-F687-4f45-9708-019B960494DF}">
-                <a14:hiddenLine xmlns:a14="http://schemas.microsoft.com/office/drawing/2010/main" xmlns="" w="9525">
+                <a14:hiddenLine xmlns="" xmlns:a14="http://schemas.microsoft.com/office/drawing/2010/main" w="9525">
                   <a:solidFill>
                     <a:srgbClr val="000000"/>
                   </a:solidFill>
@@ -3280,7 +3285,7 @@
             </a:ln>
             <a:extLst>
               <a:ext uri="{91240B29-F687-4f45-9708-019B960494DF}">
-                <a14:hiddenLine xmlns:a14="http://schemas.microsoft.com/office/drawing/2010/main" xmlns="" w="9525">
+                <a14:hiddenLine xmlns="" xmlns:a14="http://schemas.microsoft.com/office/drawing/2010/main" w="9525">
                   <a:solidFill>
                     <a:srgbClr val="000000"/>
                   </a:solidFill>
@@ -3370,7 +3375,7 @@
             </a:ln>
             <a:extLst>
               <a:ext uri="{91240B29-F687-4f45-9708-019B960494DF}">
-                <a14:hiddenLine xmlns:a14="http://schemas.microsoft.com/office/drawing/2010/main" xmlns="" w="9525">
+                <a14:hiddenLine xmlns="" xmlns:a14="http://schemas.microsoft.com/office/drawing/2010/main" w="9525">
                   <a:solidFill>
                     <a:srgbClr val="000000"/>
                   </a:solidFill>
@@ -3432,7 +3437,7 @@
             </a:ln>
             <a:extLst>
               <a:ext uri="{91240B29-F687-4f45-9708-019B960494DF}">
-                <a14:hiddenLine xmlns:a14="http://schemas.microsoft.com/office/drawing/2010/main" xmlns="" w="9525">
+                <a14:hiddenLine xmlns="" xmlns:a14="http://schemas.microsoft.com/office/drawing/2010/main" w="9525">
                   <a:solidFill>
                     <a:srgbClr val="000000"/>
                   </a:solidFill>
@@ -3522,7 +3527,7 @@
             </a:ln>
             <a:extLst>
               <a:ext uri="{91240B29-F687-4f45-9708-019B960494DF}">
-                <a14:hiddenLine xmlns:a14="http://schemas.microsoft.com/office/drawing/2010/main" xmlns="" w="9525">
+                <a14:hiddenLine xmlns="" xmlns:a14="http://schemas.microsoft.com/office/drawing/2010/main" w="9525">
                   <a:solidFill>
                     <a:srgbClr val="000000"/>
                   </a:solidFill>
@@ -3612,7 +3617,7 @@
             </a:ln>
             <a:extLst>
               <a:ext uri="{91240B29-F687-4f45-9708-019B960494DF}">
-                <a14:hiddenLine xmlns:a14="http://schemas.microsoft.com/office/drawing/2010/main" xmlns="" w="9525">
+                <a14:hiddenLine xmlns="" xmlns:a14="http://schemas.microsoft.com/office/drawing/2010/main" w="9525">
                   <a:solidFill>
                     <a:srgbClr val="000000"/>
                   </a:solidFill>
@@ -3677,7 +3682,7 @@
             </a:ln>
             <a:extLst>
               <a:ext uri="{91240B29-F687-4f45-9708-019B960494DF}">
-                <a14:hiddenLine xmlns:a14="http://schemas.microsoft.com/office/drawing/2010/main" xmlns="" w="9525">
+                <a14:hiddenLine xmlns="" xmlns:a14="http://schemas.microsoft.com/office/drawing/2010/main" w="9525">
                   <a:solidFill>
                     <a:srgbClr val="000000"/>
                   </a:solidFill>
@@ -3739,7 +3744,7 @@
             </a:ln>
             <a:extLst>
               <a:ext uri="{91240B29-F687-4f45-9708-019B960494DF}">
-                <a14:hiddenLine xmlns:a14="http://schemas.microsoft.com/office/drawing/2010/main" xmlns="" w="9525">
+                <a14:hiddenLine xmlns="" xmlns:a14="http://schemas.microsoft.com/office/drawing/2010/main" w="9525">
                   <a:solidFill>
                     <a:srgbClr val="000000"/>
                   </a:solidFill>
@@ -3829,7 +3834,7 @@
             </a:ln>
             <a:extLst>
               <a:ext uri="{91240B29-F687-4f45-9708-019B960494DF}">
-                <a14:hiddenLine xmlns:a14="http://schemas.microsoft.com/office/drawing/2010/main" xmlns="" w="9525">
+                <a14:hiddenLine xmlns="" xmlns:a14="http://schemas.microsoft.com/office/drawing/2010/main" w="9525">
                   <a:solidFill>
                     <a:srgbClr val="000000"/>
                   </a:solidFill>
@@ -3919,7 +3924,7 @@
             </a:ln>
             <a:extLst>
               <a:ext uri="{91240B29-F687-4f45-9708-019B960494DF}">
-                <a14:hiddenLine xmlns:a14="http://schemas.microsoft.com/office/drawing/2010/main" xmlns="" w="9525">
+                <a14:hiddenLine xmlns="" xmlns:a14="http://schemas.microsoft.com/office/drawing/2010/main" w="9525">
                   <a:solidFill>
                     <a:srgbClr val="000000"/>
                   </a:solidFill>
@@ -3981,7 +3986,7 @@
             </a:ln>
             <a:extLst>
               <a:ext uri="{91240B29-F687-4f45-9708-019B960494DF}">
-                <a14:hiddenLine xmlns:a14="http://schemas.microsoft.com/office/drawing/2010/main" xmlns="" w="9525">
+                <a14:hiddenLine xmlns="" xmlns:a14="http://schemas.microsoft.com/office/drawing/2010/main" w="9525">
                   <a:solidFill>
                     <a:srgbClr val="000000"/>
                   </a:solidFill>
@@ -4101,7 +4106,7 @@
             </a:ln>
             <a:extLst>
               <a:ext uri="{91240B29-F687-4f45-9708-019B960494DF}">
-                <a14:hiddenLine xmlns:a14="http://schemas.microsoft.com/office/drawing/2010/main" xmlns="" w="9525">
+                <a14:hiddenLine xmlns="" xmlns:a14="http://schemas.microsoft.com/office/drawing/2010/main" w="9525">
                   <a:solidFill>
                     <a:srgbClr val="000000"/>
                   </a:solidFill>
@@ -4169,7 +4174,7 @@
             </a:ln>
             <a:extLst>
               <a:ext uri="{91240B29-F687-4f45-9708-019B960494DF}">
-                <a14:hiddenLine xmlns:a14="http://schemas.microsoft.com/office/drawing/2010/main" xmlns="" w="9525">
+                <a14:hiddenLine xmlns="" xmlns:a14="http://schemas.microsoft.com/office/drawing/2010/main" w="9525">
                   <a:solidFill>
                     <a:srgbClr val="000000"/>
                   </a:solidFill>
@@ -4259,7 +4264,7 @@
             </a:ln>
             <a:extLst>
               <a:ext uri="{91240B29-F687-4f45-9708-019B960494DF}">
-                <a14:hiddenLine xmlns:a14="http://schemas.microsoft.com/office/drawing/2010/main" xmlns="" w="9525">
+                <a14:hiddenLine xmlns="" xmlns:a14="http://schemas.microsoft.com/office/drawing/2010/main" w="9525">
                   <a:solidFill>
                     <a:srgbClr val="000000"/>
                   </a:solidFill>
@@ -9073,7 +9078,7 @@
           <a:noFill/>
           <a:extLst>
             <a:ext uri="{909E8E84-426E-40dd-AFC4-6F175D3DCCD1}">
-              <a14:hiddenFill xmlns:a14="http://schemas.microsoft.com/office/drawing/2010/main" xmlns="">
+              <a14:hiddenFill xmlns="" xmlns:a14="http://schemas.microsoft.com/office/drawing/2010/main">
                 <a:solidFill>
                   <a:srgbClr val="FFFFFF"/>
                 </a:solidFill>
@@ -9147,7 +9152,7 @@
               </a:ln>
               <a:extLst>
                 <a:ext uri="{91240B29-F687-4f45-9708-019B960494DF}">
-                  <a14:hiddenLine xmlns:a14="http://schemas.microsoft.com/office/drawing/2010/main" xmlns="" w="9525">
+                  <a14:hiddenLine xmlns="" xmlns:a14="http://schemas.microsoft.com/office/drawing/2010/main" w="9525">
                     <a:solidFill>
                       <a:srgbClr val="000000"/>
                     </a:solidFill>
@@ -9237,7 +9242,7 @@
               </a:ln>
               <a:extLst>
                 <a:ext uri="{91240B29-F687-4f45-9708-019B960494DF}">
-                  <a14:hiddenLine xmlns:a14="http://schemas.microsoft.com/office/drawing/2010/main" xmlns="" w="9525">
+                  <a14:hiddenLine xmlns="" xmlns:a14="http://schemas.microsoft.com/office/drawing/2010/main" w="9525">
                     <a:solidFill>
                       <a:srgbClr val="000000"/>
                     </a:solidFill>
@@ -9327,7 +9332,7 @@
               </a:ln>
               <a:extLst>
                 <a:ext uri="{91240B29-F687-4f45-9708-019B960494DF}">
-                  <a14:hiddenLine xmlns:a14="http://schemas.microsoft.com/office/drawing/2010/main" xmlns="" w="9525">
+                  <a14:hiddenLine xmlns="" xmlns:a14="http://schemas.microsoft.com/office/drawing/2010/main" w="9525">
                     <a:solidFill>
                       <a:srgbClr val="000000"/>
                     </a:solidFill>
@@ -9389,7 +9394,7 @@
               </a:ln>
               <a:extLst>
                 <a:ext uri="{91240B29-F687-4f45-9708-019B960494DF}">
-                  <a14:hiddenLine xmlns:a14="http://schemas.microsoft.com/office/drawing/2010/main" xmlns="" w="9525">
+                  <a14:hiddenLine xmlns="" xmlns:a14="http://schemas.microsoft.com/office/drawing/2010/main" w="9525">
                     <a:solidFill>
                       <a:srgbClr val="000000"/>
                     </a:solidFill>
@@ -9479,7 +9484,7 @@
               </a:ln>
               <a:extLst>
                 <a:ext uri="{91240B29-F687-4f45-9708-019B960494DF}">
-                  <a14:hiddenLine xmlns:a14="http://schemas.microsoft.com/office/drawing/2010/main" xmlns="" w="9525">
+                  <a14:hiddenLine xmlns="" xmlns:a14="http://schemas.microsoft.com/office/drawing/2010/main" w="9525">
                     <a:solidFill>
                       <a:srgbClr val="000000"/>
                     </a:solidFill>
@@ -9541,7 +9546,7 @@
               </a:ln>
               <a:extLst>
                 <a:ext uri="{91240B29-F687-4f45-9708-019B960494DF}">
-                  <a14:hiddenLine xmlns:a14="http://schemas.microsoft.com/office/drawing/2010/main" xmlns="" w="9525">
+                  <a14:hiddenLine xmlns="" xmlns:a14="http://schemas.microsoft.com/office/drawing/2010/main" w="9525">
                     <a:solidFill>
                       <a:srgbClr val="000000"/>
                     </a:solidFill>
@@ -9603,7 +9608,7 @@
               </a:ln>
               <a:extLst>
                 <a:ext uri="{91240B29-F687-4f45-9708-019B960494DF}">
-                  <a14:hiddenLine xmlns:a14="http://schemas.microsoft.com/office/drawing/2010/main" xmlns="" w="9525">
+                  <a14:hiddenLine xmlns="" xmlns:a14="http://schemas.microsoft.com/office/drawing/2010/main" w="9525">
                     <a:solidFill>
                       <a:srgbClr val="000000"/>
                     </a:solidFill>
@@ -9693,7 +9698,7 @@
               </a:ln>
               <a:extLst>
                 <a:ext uri="{91240B29-F687-4f45-9708-019B960494DF}">
-                  <a14:hiddenLine xmlns:a14="http://schemas.microsoft.com/office/drawing/2010/main" xmlns="" w="9525">
+                  <a14:hiddenLine xmlns="" xmlns:a14="http://schemas.microsoft.com/office/drawing/2010/main" w="9525">
                     <a:solidFill>
                       <a:srgbClr val="000000"/>
                     </a:solidFill>
@@ -9783,7 +9788,7 @@
               </a:ln>
               <a:extLst>
                 <a:ext uri="{91240B29-F687-4f45-9708-019B960494DF}">
-                  <a14:hiddenLine xmlns:a14="http://schemas.microsoft.com/office/drawing/2010/main" xmlns="" w="9525">
+                  <a14:hiddenLine xmlns="" xmlns:a14="http://schemas.microsoft.com/office/drawing/2010/main" w="9525">
                     <a:solidFill>
                       <a:srgbClr val="000000"/>
                     </a:solidFill>
@@ -9845,7 +9850,7 @@
               </a:ln>
               <a:extLst>
                 <a:ext uri="{91240B29-F687-4f45-9708-019B960494DF}">
-                  <a14:hiddenLine xmlns:a14="http://schemas.microsoft.com/office/drawing/2010/main" xmlns="" w="9525">
+                  <a14:hiddenLine xmlns="" xmlns:a14="http://schemas.microsoft.com/office/drawing/2010/main" w="9525">
                     <a:solidFill>
                       <a:srgbClr val="000000"/>
                     </a:solidFill>
@@ -9955,7 +9960,7 @@
               </a:ln>
               <a:extLst>
                 <a:ext uri="{91240B29-F687-4f45-9708-019B960494DF}">
-                  <a14:hiddenLine xmlns:a14="http://schemas.microsoft.com/office/drawing/2010/main" xmlns="" w="9525">
+                  <a14:hiddenLine xmlns="" xmlns:a14="http://schemas.microsoft.com/office/drawing/2010/main" w="9525">
                     <a:solidFill>
                       <a:srgbClr val="000000"/>
                     </a:solidFill>
@@ -10039,7 +10044,7 @@
               </a:ln>
               <a:extLst>
                 <a:ext uri="{91240B29-F687-4f45-9708-019B960494DF}">
-                  <a14:hiddenLine xmlns:a14="http://schemas.microsoft.com/office/drawing/2010/main" xmlns="" w="9525">
+                  <a14:hiddenLine xmlns="" xmlns:a14="http://schemas.microsoft.com/office/drawing/2010/main" w="9525">
                     <a:solidFill>
                       <a:srgbClr val="000000"/>
                     </a:solidFill>
@@ -10101,7 +10106,7 @@
               </a:ln>
               <a:extLst>
                 <a:ext uri="{91240B29-F687-4f45-9708-019B960494DF}">
-                  <a14:hiddenLine xmlns:a14="http://schemas.microsoft.com/office/drawing/2010/main" xmlns="" w="9525">
+                  <a14:hiddenLine xmlns="" xmlns:a14="http://schemas.microsoft.com/office/drawing/2010/main" w="9525">
                     <a:solidFill>
                       <a:srgbClr val="000000"/>
                     </a:solidFill>
@@ -10163,7 +10168,7 @@
               </a:ln>
               <a:extLst>
                 <a:ext uri="{91240B29-F687-4f45-9708-019B960494DF}">
-                  <a14:hiddenLine xmlns:a14="http://schemas.microsoft.com/office/drawing/2010/main" xmlns="" w="9525">
+                  <a14:hiddenLine xmlns="" xmlns:a14="http://schemas.microsoft.com/office/drawing/2010/main" w="9525">
                     <a:solidFill>
                       <a:srgbClr val="000000"/>
                     </a:solidFill>
@@ -10253,7 +10258,7 @@
               </a:ln>
               <a:extLst>
                 <a:ext uri="{91240B29-F687-4f45-9708-019B960494DF}">
-                  <a14:hiddenLine xmlns:a14="http://schemas.microsoft.com/office/drawing/2010/main" xmlns="" w="9525">
+                  <a14:hiddenLine xmlns="" xmlns:a14="http://schemas.microsoft.com/office/drawing/2010/main" w="9525">
                     <a:solidFill>
                       <a:srgbClr val="000000"/>
                     </a:solidFill>
@@ -10287,7 +10292,7 @@
               </a:ln>
               <a:extLst>
                 <a:ext uri="{91240B29-F687-4f45-9708-019B960494DF}">
-                  <a14:hiddenLine xmlns:a14="http://schemas.microsoft.com/office/drawing/2010/main" xmlns="" w="9525">
+                  <a14:hiddenLine xmlns="" xmlns:a14="http://schemas.microsoft.com/office/drawing/2010/main" w="9525">
                     <a:solidFill>
                       <a:srgbClr val="000000"/>
                     </a:solidFill>
@@ -10352,7 +10357,7 @@
               </a:ln>
               <a:extLst>
                 <a:ext uri="{91240B29-F687-4f45-9708-019B960494DF}">
-                  <a14:hiddenLine xmlns:a14="http://schemas.microsoft.com/office/drawing/2010/main" xmlns="" w="9525">
+                  <a14:hiddenLine xmlns="" xmlns:a14="http://schemas.microsoft.com/office/drawing/2010/main" w="9525">
                     <a:solidFill>
                       <a:srgbClr val="000000"/>
                     </a:solidFill>
@@ -10442,7 +10447,7 @@
               </a:ln>
               <a:extLst>
                 <a:ext uri="{91240B29-F687-4f45-9708-019B960494DF}">
-                  <a14:hiddenLine xmlns:a14="http://schemas.microsoft.com/office/drawing/2010/main" xmlns="" w="9525">
+                  <a14:hiddenLine xmlns="" xmlns:a14="http://schemas.microsoft.com/office/drawing/2010/main" w="9525">
                     <a:solidFill>
                       <a:srgbClr val="000000"/>
                     </a:solidFill>
@@ -10504,7 +10509,7 @@
               </a:ln>
               <a:extLst>
                 <a:ext uri="{91240B29-F687-4f45-9708-019B960494DF}">
-                  <a14:hiddenLine xmlns:a14="http://schemas.microsoft.com/office/drawing/2010/main" xmlns="" w="9525">
+                  <a14:hiddenLine xmlns="" xmlns:a14="http://schemas.microsoft.com/office/drawing/2010/main" w="9525">
                     <a:solidFill>
                       <a:srgbClr val="000000"/>
                     </a:solidFill>
@@ -10594,7 +10599,7 @@
               </a:ln>
               <a:extLst>
                 <a:ext uri="{91240B29-F687-4f45-9708-019B960494DF}">
-                  <a14:hiddenLine xmlns:a14="http://schemas.microsoft.com/office/drawing/2010/main" xmlns="" w="9525">
+                  <a14:hiddenLine xmlns="" xmlns:a14="http://schemas.microsoft.com/office/drawing/2010/main" w="9525">
                     <a:solidFill>
                       <a:srgbClr val="000000"/>
                     </a:solidFill>
@@ -10659,7 +10664,7 @@
               </a:ln>
               <a:extLst>
                 <a:ext uri="{91240B29-F687-4f45-9708-019B960494DF}">
-                  <a14:hiddenLine xmlns:a14="http://schemas.microsoft.com/office/drawing/2010/main" xmlns="" w="9525">
+                  <a14:hiddenLine xmlns="" xmlns:a14="http://schemas.microsoft.com/office/drawing/2010/main" w="9525">
                     <a:solidFill>
                       <a:srgbClr val="000000"/>
                     </a:solidFill>
@@ -10721,7 +10726,7 @@
               </a:ln>
               <a:extLst>
                 <a:ext uri="{91240B29-F687-4f45-9708-019B960494DF}">
-                  <a14:hiddenLine xmlns:a14="http://schemas.microsoft.com/office/drawing/2010/main" xmlns="" w="9525">
+                  <a14:hiddenLine xmlns="" xmlns:a14="http://schemas.microsoft.com/office/drawing/2010/main" w="9525">
                     <a:solidFill>
                       <a:srgbClr val="000000"/>
                     </a:solidFill>
@@ -10811,7 +10816,7 @@
               </a:ln>
               <a:extLst>
                 <a:ext uri="{91240B29-F687-4f45-9708-019B960494DF}">
-                  <a14:hiddenLine xmlns:a14="http://schemas.microsoft.com/office/drawing/2010/main" xmlns="" w="9525">
+                  <a14:hiddenLine xmlns="" xmlns:a14="http://schemas.microsoft.com/office/drawing/2010/main" w="9525">
                     <a:solidFill>
                       <a:srgbClr val="000000"/>
                     </a:solidFill>
@@ -10901,7 +10906,7 @@
               </a:ln>
               <a:extLst>
                 <a:ext uri="{91240B29-F687-4f45-9708-019B960494DF}">
-                  <a14:hiddenLine xmlns:a14="http://schemas.microsoft.com/office/drawing/2010/main" xmlns="" w="9525">
+                  <a14:hiddenLine xmlns="" xmlns:a14="http://schemas.microsoft.com/office/drawing/2010/main" w="9525">
                     <a:solidFill>
                       <a:srgbClr val="000000"/>
                     </a:solidFill>
@@ -10966,7 +10971,7 @@
               </a:ln>
               <a:extLst>
                 <a:ext uri="{91240B29-F687-4f45-9708-019B960494DF}">
-                  <a14:hiddenLine xmlns:a14="http://schemas.microsoft.com/office/drawing/2010/main" xmlns="" w="9525">
+                  <a14:hiddenLine xmlns="" xmlns:a14="http://schemas.microsoft.com/office/drawing/2010/main" w="9525">
                     <a:solidFill>
                       <a:srgbClr val="000000"/>
                     </a:solidFill>
@@ -11086,7 +11091,7 @@
               </a:ln>
               <a:extLst>
                 <a:ext uri="{91240B29-F687-4f45-9708-019B960494DF}">
-                  <a14:hiddenLine xmlns:a14="http://schemas.microsoft.com/office/drawing/2010/main" xmlns="" w="9525">
+                  <a14:hiddenLine xmlns="" xmlns:a14="http://schemas.microsoft.com/office/drawing/2010/main" w="9525">
                     <a:solidFill>
                       <a:srgbClr val="000000"/>
                     </a:solidFill>
@@ -11167,7 +11172,7 @@
               </a:ln>
               <a:extLst>
                 <a:ext uri="{91240B29-F687-4f45-9708-019B960494DF}">
-                  <a14:hiddenLine xmlns:a14="http://schemas.microsoft.com/office/drawing/2010/main" xmlns="" w="9525">
+                  <a14:hiddenLine xmlns="" xmlns:a14="http://schemas.microsoft.com/office/drawing/2010/main" w="9525">
                     <a:solidFill>
                       <a:srgbClr val="000000"/>
                     </a:solidFill>
@@ -11282,7 +11287,7 @@
               </a:ln>
               <a:extLst>
                 <a:ext uri="{91240B29-F687-4f45-9708-019B960494DF}">
-                  <a14:hiddenLine xmlns:a14="http://schemas.microsoft.com/office/drawing/2010/main" xmlns="" w="9525">
+                  <a14:hiddenLine xmlns="" xmlns:a14="http://schemas.microsoft.com/office/drawing/2010/main" w="9525">
                     <a:solidFill>
                       <a:srgbClr val="000000"/>
                     </a:solidFill>
@@ -11372,7 +11377,7 @@
               </a:ln>
               <a:extLst>
                 <a:ext uri="{91240B29-F687-4f45-9708-019B960494DF}">
-                  <a14:hiddenLine xmlns:a14="http://schemas.microsoft.com/office/drawing/2010/main" xmlns="" w="9525">
+                  <a14:hiddenLine xmlns="" xmlns:a14="http://schemas.microsoft.com/office/drawing/2010/main" w="9525">
                     <a:solidFill>
                       <a:srgbClr val="000000"/>
                     </a:solidFill>
@@ -11437,7 +11442,7 @@
               </a:ln>
               <a:extLst>
                 <a:ext uri="{91240B29-F687-4f45-9708-019B960494DF}">
-                  <a14:hiddenLine xmlns:a14="http://schemas.microsoft.com/office/drawing/2010/main" xmlns="" w="9525">
+                  <a14:hiddenLine xmlns="" xmlns:a14="http://schemas.microsoft.com/office/drawing/2010/main" w="9525">
                     <a:solidFill>
                       <a:srgbClr val="000000"/>
                     </a:solidFill>
@@ -11527,7 +11532,7 @@
               </a:ln>
               <a:extLst>
                 <a:ext uri="{91240B29-F687-4f45-9708-019B960494DF}">
-                  <a14:hiddenLine xmlns:a14="http://schemas.microsoft.com/office/drawing/2010/main" xmlns="" w="9525">
+                  <a14:hiddenLine xmlns="" xmlns:a14="http://schemas.microsoft.com/office/drawing/2010/main" w="9525">
                     <a:solidFill>
                       <a:srgbClr val="000000"/>
                     </a:solidFill>
@@ -11595,7 +11600,7 @@
               </a:ln>
               <a:extLst>
                 <a:ext uri="{91240B29-F687-4f45-9708-019B960494DF}">
-                  <a14:hiddenLine xmlns:a14="http://schemas.microsoft.com/office/drawing/2010/main" xmlns="" w="9525">
+                  <a14:hiddenLine xmlns="" xmlns:a14="http://schemas.microsoft.com/office/drawing/2010/main" w="9525">
                     <a:solidFill>
                       <a:srgbClr val="000000"/>
                     </a:solidFill>
@@ -11685,7 +11690,7 @@
               </a:ln>
               <a:extLst>
                 <a:ext uri="{91240B29-F687-4f45-9708-019B960494DF}">
-                  <a14:hiddenLine xmlns:a14="http://schemas.microsoft.com/office/drawing/2010/main" xmlns="" w="9525">
+                  <a14:hiddenLine xmlns="" xmlns:a14="http://schemas.microsoft.com/office/drawing/2010/main" w="9525">
                     <a:solidFill>
                       <a:srgbClr val="000000"/>
                     </a:solidFill>
@@ -11753,7 +11758,7 @@
               </a:ln>
               <a:extLst>
                 <a:ext uri="{91240B29-F687-4f45-9708-019B960494DF}">
-                  <a14:hiddenLine xmlns:a14="http://schemas.microsoft.com/office/drawing/2010/main" xmlns="" w="9525">
+                  <a14:hiddenLine xmlns="" xmlns:a14="http://schemas.microsoft.com/office/drawing/2010/main" w="9525">
                     <a:solidFill>
                       <a:srgbClr val="000000"/>
                     </a:solidFill>
@@ -11843,7 +11848,7 @@
               </a:ln>
               <a:extLst>
                 <a:ext uri="{91240B29-F687-4f45-9708-019B960494DF}">
-                  <a14:hiddenLine xmlns:a14="http://schemas.microsoft.com/office/drawing/2010/main" xmlns="" w="9525">
+                  <a14:hiddenLine xmlns="" xmlns:a14="http://schemas.microsoft.com/office/drawing/2010/main" w="9525">
                     <a:solidFill>
                       <a:srgbClr val="000000"/>
                     </a:solidFill>
@@ -11877,7 +11882,7 @@
               </a:ln>
               <a:extLst>
                 <a:ext uri="{91240B29-F687-4f45-9708-019B960494DF}">
-                  <a14:hiddenLine xmlns:a14="http://schemas.microsoft.com/office/drawing/2010/main" xmlns="" w="9525">
+                  <a14:hiddenLine xmlns="" xmlns:a14="http://schemas.microsoft.com/office/drawing/2010/main" w="9525">
                     <a:solidFill>
                       <a:srgbClr val="000000"/>
                     </a:solidFill>
@@ -12439,10 +12444,273 @@
       </p:grpSpPr>
       <p:sp>
         <p:nvSpPr>
-          <p:cNvPr id="2" name="Title 1">
+          <p:cNvPr id="4" name="Rectangle 1">
             <a:extLst>
               <a:ext uri="{FF2B5EF4-FFF2-40B4-BE49-F238E27FC236}">
-                <a16:creationId xmlns:a16="http://schemas.microsoft.com/office/drawing/2014/main" id="{7FFA84FB-E56D-402B-BC61-124DF6251B8B}"/>
+                <a16:creationId xmlns:a16="http://schemas.microsoft.com/office/drawing/2014/main" id="{3CADC3FD-14CF-44BF-B4E1-957E1C7E099E}"/>
+              </a:ext>
+            </a:extLst>
+          </p:cNvPr>
+          <p:cNvSpPr>
+            <a:spLocks noGrp="1" noChangeArrowheads="1"/>
+          </p:cNvSpPr>
+          <p:nvPr>
+            <p:ph type="subTitle" idx="1"/>
+          </p:nvPr>
+        </p:nvSpPr>
+        <p:spPr bwMode="auto">
+          <a:xfrm>
+            <a:off x="5638800" y="3822347"/>
+            <a:ext cx="1891861" cy="923330"/>
+          </a:xfrm>
+          <a:prstGeom prst="rect">
+            <a:avLst/>
+          </a:prstGeom>
+          <a:noFill/>
+          <a:ln>
+            <a:noFill/>
+          </a:ln>
+          <a:effectLst/>
+          <a:extLst>
+            <a:ext uri="{909E8E84-426E-40DD-AFC4-6F175D3DCCD1}">
+              <a14:hiddenFill xmlns:a14="http://schemas.microsoft.com/office/drawing/2010/main">
+                <a:solidFill>
+                  <a:schemeClr val="accent1"/>
+                </a:solidFill>
+              </a14:hiddenFill>
+            </a:ext>
+            <a:ext uri="{91240B29-F687-4F45-9708-019B960494DF}">
+              <a14:hiddenLine xmlns:a14="http://schemas.microsoft.com/office/drawing/2010/main" w="9525">
+                <a:solidFill>
+                  <a:schemeClr val="tx1"/>
+                </a:solidFill>
+                <a:miter lim="800000"/>
+                <a:headEnd/>
+                <a:tailEnd/>
+              </a14:hiddenLine>
+            </a:ext>
+            <a:ext uri="{AF507438-7753-43E0-B8FC-AC1667EBCBE1}">
+              <a14:hiddenEffects xmlns:a14="http://schemas.microsoft.com/office/drawing/2010/main">
+                <a:effectLst>
+                  <a:outerShdw dist="35921" dir="2700000" algn="ctr" rotWithShape="0">
+                    <a:schemeClr val="bg2"/>
+                  </a:outerShdw>
+                </a:effectLst>
+              </a14:hiddenEffects>
+            </a:ext>
+          </a:extLst>
+        </p:spPr>
+        <p:txBody>
+          <a:bodyPr vert="horz" wrap="square" lIns="91440" tIns="45720" rIns="91440" bIns="45720" numCol="1" anchor="ctr" anchorCtr="0" compatLnSpc="1">
+            <a:prstTxWarp prst="textNoShape">
+              <a:avLst/>
+            </a:prstTxWarp>
+            <a:spAutoFit/>
+          </a:bodyPr>
+          <a:lstStyle/>
+          <a:p>
+            <a:pPr marL="0" marR="0" lvl="0" indent="0" algn="ctr" defTabSz="914400" rtl="0" eaLnBrk="0" fontAlgn="base" latinLnBrk="0" hangingPunct="0">
+              <a:lnSpc>
+                <a:spcPct val="100000"/>
+              </a:lnSpc>
+              <a:spcBef>
+                <a:spcPct val="0"/>
+              </a:spcBef>
+              <a:spcAft>
+                <a:spcPct val="0"/>
+              </a:spcAft>
+              <a:buClrTx/>
+              <a:buSzTx/>
+              <a:buFontTx/>
+              <a:buNone/>
+              <a:tabLst/>
+            </a:pPr>
+            <a:r>
+              <a:rPr kumimoji="0" lang="en-US" altLang="en-US" sz="1400" b="0" i="0" u="none" strike="noStrike" cap="none" normalizeH="0" baseline="0" dirty="0">
+                <a:ln>
+                  <a:noFill/>
+                </a:ln>
+                <a:solidFill>
+                  <a:schemeClr val="tx2">
+                    <a:lumMod val="20000"/>
+                    <a:lumOff val="80000"/>
+                  </a:schemeClr>
+                </a:solidFill>
+                <a:effectLst/>
+                <a:latin typeface="Calibri" panose="020F0502020204030204" pitchFamily="34" charset="0"/>
+                <a:ea typeface="Times New Roman" panose="02020603050405020304" pitchFamily="18" charset="0"/>
+                <a:cs typeface="Times New Roman" panose="02020603050405020304" pitchFamily="18" charset="0"/>
+              </a:rPr>
+              <a:t>Yair Levy, Ph.D.</a:t>
+            </a:r>
+          </a:p>
+          <a:p>
+            <a:pPr lvl="0" algn="ctr" eaLnBrk="0" fontAlgn="base" hangingPunct="0">
+              <a:lnSpc>
+                <a:spcPct val="100000"/>
+              </a:lnSpc>
+              <a:spcBef>
+                <a:spcPct val="0"/>
+              </a:spcBef>
+              <a:spcAft>
+                <a:spcPct val="0"/>
+              </a:spcAft>
+              <a:buSzTx/>
+            </a:pPr>
+            <a:r>
+              <a:rPr lang="en-US" altLang="en-US" sz="1000" b="1" cap="none" dirty="0">
+                <a:solidFill>
+                  <a:schemeClr val="tx2">
+                    <a:lumMod val="20000"/>
+                    <a:lumOff val="80000"/>
+                  </a:schemeClr>
+                </a:solidFill>
+                <a:latin typeface="Calibri" panose="020F0502020204030204" pitchFamily="34" charset="0"/>
+                <a:ea typeface="Times New Roman" panose="02020603050405020304" pitchFamily="18" charset="0"/>
+                <a:cs typeface="Times New Roman" panose="02020603050405020304" pitchFamily="18" charset="0"/>
+              </a:rPr>
+              <a:t>Nova Southeastern University</a:t>
+            </a:r>
+            <a:endParaRPr kumimoji="0" lang="en-US" altLang="en-US" sz="800" b="0" i="0" u="none" strike="noStrike" cap="none" normalizeH="0" baseline="0" dirty="0">
+              <a:ln>
+                <a:noFill/>
+              </a:ln>
+              <a:solidFill>
+                <a:schemeClr val="tx2">
+                  <a:lumMod val="20000"/>
+                  <a:lumOff val="80000"/>
+                </a:schemeClr>
+              </a:solidFill>
+              <a:effectLst/>
+            </a:endParaRPr>
+          </a:p>
+          <a:p>
+            <a:pPr marL="0" marR="0" lvl="0" indent="0" algn="ctr" defTabSz="914400" rtl="0" eaLnBrk="0" fontAlgn="base" latinLnBrk="0" hangingPunct="0">
+              <a:lnSpc>
+                <a:spcPct val="100000"/>
+              </a:lnSpc>
+              <a:spcBef>
+                <a:spcPct val="0"/>
+              </a:spcBef>
+              <a:spcAft>
+                <a:spcPct val="0"/>
+              </a:spcAft>
+              <a:buClrTx/>
+              <a:buSzTx/>
+              <a:buFontTx/>
+              <a:buNone/>
+              <a:tabLst/>
+            </a:pPr>
+            <a:r>
+              <a:rPr kumimoji="0" lang="en-US" altLang="en-US" sz="1000" b="1" i="0" u="none" strike="noStrike" cap="none" normalizeH="0" baseline="0" dirty="0">
+                <a:ln>
+                  <a:noFill/>
+                </a:ln>
+                <a:solidFill>
+                  <a:schemeClr val="tx2">
+                    <a:lumMod val="20000"/>
+                    <a:lumOff val="80000"/>
+                  </a:schemeClr>
+                </a:solidFill>
+                <a:effectLst/>
+                <a:latin typeface="Calibri" panose="020F0502020204030204" pitchFamily="34" charset="0"/>
+                <a:ea typeface="Times New Roman" panose="02020603050405020304" pitchFamily="18" charset="0"/>
+                <a:cs typeface="Times New Roman" panose="02020603050405020304" pitchFamily="18" charset="0"/>
+              </a:rPr>
+              <a:t>ISEC 690</a:t>
+            </a:r>
+            <a:br>
+              <a:rPr kumimoji="0" lang="en-US" altLang="en-US" sz="1000" b="1" i="0" u="none" strike="noStrike" cap="none" normalizeH="0" baseline="0" dirty="0">
+                <a:ln>
+                  <a:noFill/>
+                </a:ln>
+                <a:solidFill>
+                  <a:schemeClr val="tx2">
+                    <a:lumMod val="20000"/>
+                    <a:lumOff val="80000"/>
+                  </a:schemeClr>
+                </a:solidFill>
+                <a:effectLst/>
+                <a:latin typeface="Calibri" panose="020F0502020204030204" pitchFamily="34" charset="0"/>
+                <a:ea typeface="Times New Roman" panose="02020603050405020304" pitchFamily="18" charset="0"/>
+                <a:cs typeface="Times New Roman" panose="02020603050405020304" pitchFamily="18" charset="0"/>
+              </a:rPr>
+            </a:br>
+            <a:r>
+              <a:rPr kumimoji="0" lang="en-US" altLang="en-US" sz="1000" b="1" i="0" u="none" strike="noStrike" cap="none" normalizeH="0" baseline="0" dirty="0">
+                <a:ln>
+                  <a:noFill/>
+                </a:ln>
+                <a:solidFill>
+                  <a:schemeClr val="tx2">
+                    <a:lumMod val="20000"/>
+                    <a:lumOff val="80000"/>
+                  </a:schemeClr>
+                </a:solidFill>
+                <a:effectLst/>
+                <a:latin typeface="Calibri" panose="020F0502020204030204" pitchFamily="34" charset="0"/>
+                <a:ea typeface="Times New Roman" panose="02020603050405020304" pitchFamily="18" charset="0"/>
+                <a:cs typeface="Times New Roman" panose="02020603050405020304" pitchFamily="18" charset="0"/>
+              </a:rPr>
+              <a:t>Fall 2020</a:t>
+            </a:r>
+            <a:br>
+              <a:rPr kumimoji="0" lang="en-US" altLang="en-US" sz="1000" b="1" i="0" u="none" strike="noStrike" cap="none" normalizeH="0" baseline="0" dirty="0">
+                <a:ln>
+                  <a:noFill/>
+                </a:ln>
+                <a:solidFill>
+                  <a:schemeClr val="tx2">
+                    <a:lumMod val="20000"/>
+                    <a:lumOff val="80000"/>
+                  </a:schemeClr>
+                </a:solidFill>
+                <a:effectLst/>
+                <a:latin typeface="Calibri" panose="020F0502020204030204" pitchFamily="34" charset="0"/>
+                <a:ea typeface="Times New Roman" panose="02020603050405020304" pitchFamily="18" charset="0"/>
+                <a:cs typeface="Times New Roman" panose="02020603050405020304" pitchFamily="18" charset="0"/>
+              </a:rPr>
+            </a:br>
+            <a:r>
+              <a:rPr kumimoji="0" lang="en-US" altLang="en-US" sz="1000" b="1" i="0" u="none" strike="noStrike" cap="none" normalizeH="0" baseline="0" dirty="0">
+                <a:ln>
+                  <a:noFill/>
+                </a:ln>
+                <a:solidFill>
+                  <a:schemeClr val="tx2">
+                    <a:lumMod val="20000"/>
+                    <a:lumOff val="80000"/>
+                  </a:schemeClr>
+                </a:solidFill>
+                <a:effectLst/>
+                <a:latin typeface="Calibri" panose="020F0502020204030204" pitchFamily="34" charset="0"/>
+                <a:ea typeface="Times New Roman" panose="02020603050405020304" pitchFamily="18" charset="0"/>
+                <a:cs typeface="Times New Roman" panose="02020603050405020304" pitchFamily="18" charset="0"/>
+              </a:rPr>
+              <a:t>October 2020</a:t>
+            </a:r>
+            <a:endParaRPr kumimoji="0" lang="en-US" altLang="en-US" sz="1800" b="0" i="0" u="none" strike="noStrike" cap="none" normalizeH="0" baseline="0" dirty="0">
+              <a:ln>
+                <a:noFill/>
+              </a:ln>
+              <a:solidFill>
+                <a:schemeClr val="tx2">
+                  <a:lumMod val="20000"/>
+                  <a:lumOff val="80000"/>
+                </a:schemeClr>
+              </a:solidFill>
+              <a:effectLst/>
+              <a:latin typeface="Arial" panose="020B0604020202020204" pitchFamily="34" charset="0"/>
+            </a:endParaRPr>
+          </a:p>
+        </p:txBody>
+      </p:sp>
+      <p:sp>
+        <p:nvSpPr>
+          <p:cNvPr id="6" name="Title 5">
+            <a:extLst>
+              <a:ext uri="{FF2B5EF4-FFF2-40B4-BE49-F238E27FC236}">
+                <a16:creationId xmlns:a16="http://schemas.microsoft.com/office/drawing/2014/main" id="{0123C4D7-9F1E-49FF-B70E-94F176514C21}"/>
               </a:ext>
             </a:extLst>
           </p:cNvPr>
@@ -12453,44 +12721,212 @@
             <p:ph type="ctrTitle"/>
           </p:nvPr>
         </p:nvSpPr>
-        <p:spPr/>
+        <p:spPr>
+          <a:xfrm>
+            <a:off x="3048000" y="683171"/>
+            <a:ext cx="7073463" cy="1881353"/>
+          </a:xfrm>
+        </p:spPr>
         <p:txBody>
-          <a:bodyPr/>
+          <a:bodyPr>
+            <a:normAutofit/>
+          </a:bodyPr>
           <a:lstStyle/>
           <a:p>
+            <a:pPr marL="0" marR="0" algn="ctr">
+              <a:lnSpc>
+                <a:spcPct val="107000"/>
+              </a:lnSpc>
+              <a:spcBef>
+                <a:spcPts val="0"/>
+              </a:spcBef>
+              <a:spcAft>
+                <a:spcPts val="800"/>
+              </a:spcAft>
+            </a:pPr>
             <a:r>
-              <a:rPr lang="en-US" dirty="0"/>
-              <a:t>Project Title</a:t>
+              <a:rPr lang="en-US" sz="3600" dirty="0">
+                <a:solidFill>
+                  <a:schemeClr val="tx2">
+                    <a:lumMod val="20000"/>
+                    <a:lumOff val="80000"/>
+                  </a:schemeClr>
+                </a:solidFill>
+                <a:latin typeface="Calibri" panose="020F0502020204030204" pitchFamily="34" charset="0"/>
+                <a:ea typeface="Calibri" panose="020F0502020204030204" pitchFamily="34" charset="0"/>
+                <a:cs typeface="Times New Roman" panose="02020603050405020304" pitchFamily="18" charset="0"/>
+              </a:rPr>
+              <a:t>A Network hardening and data breach mitigation of an audio engineering studio</a:t>
             </a:r>
-            <a:br>
-              <a:rPr lang="en-US" dirty="0"/>
-            </a:br>
-            <a:endParaRPr lang="en-US" dirty="0"/>
+            <a:endParaRPr lang="en-US" dirty="0">
+              <a:solidFill>
+                <a:schemeClr val="tx2">
+                  <a:lumMod val="20000"/>
+                  <a:lumOff val="80000"/>
+                </a:schemeClr>
+              </a:solidFill>
+            </a:endParaRPr>
           </a:p>
         </p:txBody>
       </p:sp>
       <p:sp>
         <p:nvSpPr>
-          <p:cNvPr id="3" name="Subtitle 2">
+          <p:cNvPr id="7" name="Rectangle 6">
             <a:extLst>
               <a:ext uri="{FF2B5EF4-FFF2-40B4-BE49-F238E27FC236}">
-                <a16:creationId xmlns:a16="http://schemas.microsoft.com/office/drawing/2014/main" id="{8308A6E4-439D-481E-A711-F666999CC6E7}"/>
+                <a16:creationId xmlns:a16="http://schemas.microsoft.com/office/drawing/2014/main" id="{0E6DBF3F-724D-438A-B22E-768185532D9E}"/>
               </a:ext>
             </a:extLst>
           </p:cNvPr>
-          <p:cNvSpPr>
-            <a:spLocks noGrp="1"/>
-          </p:cNvSpPr>
-          <p:nvPr>
-            <p:ph type="subTitle" idx="1"/>
-          </p:nvPr>
+          <p:cNvSpPr/>
+          <p:nvPr/>
         </p:nvSpPr>
-        <p:spPr/>
+        <p:spPr>
+          <a:xfrm>
+            <a:off x="4158778" y="2645244"/>
+            <a:ext cx="4851906" cy="369332"/>
+          </a:xfrm>
+          <a:prstGeom prst="rect">
+            <a:avLst/>
+          </a:prstGeom>
+        </p:spPr>
         <p:txBody>
-          <a:bodyPr/>
+          <a:bodyPr wrap="none">
+            <a:spAutoFit/>
+          </a:bodyPr>
           <a:lstStyle/>
           <a:p>
-            <a:endParaRPr lang="en-US"/>
+            <a:r>
+              <a:rPr lang="en-US" b="1" dirty="0">
+                <a:solidFill>
+                  <a:schemeClr val="tx2">
+                    <a:lumMod val="20000"/>
+                    <a:lumOff val="80000"/>
+                  </a:schemeClr>
+                </a:solidFill>
+                <a:latin typeface="Calibri" panose="020F0502020204030204" pitchFamily="34" charset="0"/>
+                <a:ea typeface="Calibri" panose="020F0502020204030204" pitchFamily="34" charset="0"/>
+                <a:cs typeface="Times New Roman" panose="02020603050405020304" pitchFamily="18" charset="0"/>
+              </a:rPr>
+              <a:t>Authored By: Babatunde </a:t>
+            </a:r>
+            <a:r>
+              <a:rPr lang="en-US" b="1" dirty="0" err="1">
+                <a:solidFill>
+                  <a:schemeClr val="tx2">
+                    <a:lumMod val="20000"/>
+                    <a:lumOff val="80000"/>
+                  </a:schemeClr>
+                </a:solidFill>
+                <a:latin typeface="Calibri" panose="020F0502020204030204" pitchFamily="34" charset="0"/>
+                <a:ea typeface="Calibri" panose="020F0502020204030204" pitchFamily="34" charset="0"/>
+                <a:cs typeface="Times New Roman" panose="02020603050405020304" pitchFamily="18" charset="0"/>
+              </a:rPr>
+              <a:t>Somade</a:t>
+            </a:r>
+            <a:r>
+              <a:rPr lang="en-US" b="1" dirty="0">
+                <a:solidFill>
+                  <a:schemeClr val="tx2">
+                    <a:lumMod val="20000"/>
+                    <a:lumOff val="80000"/>
+                  </a:schemeClr>
+                </a:solidFill>
+                <a:latin typeface="Calibri" panose="020F0502020204030204" pitchFamily="34" charset="0"/>
+                <a:ea typeface="Calibri" panose="020F0502020204030204" pitchFamily="34" charset="0"/>
+                <a:cs typeface="Times New Roman" panose="02020603050405020304" pitchFamily="18" charset="0"/>
+              </a:rPr>
+              <a:t> and Eric Webb </a:t>
+            </a:r>
+            <a:endParaRPr lang="en-US" dirty="0">
+              <a:solidFill>
+                <a:schemeClr val="tx2">
+                  <a:lumMod val="20000"/>
+                  <a:lumOff val="80000"/>
+                </a:schemeClr>
+              </a:solidFill>
+            </a:endParaRPr>
+          </a:p>
+        </p:txBody>
+      </p:sp>
+      <p:sp>
+        <p:nvSpPr>
+          <p:cNvPr id="8" name="Rectangle 7">
+            <a:extLst>
+              <a:ext uri="{FF2B5EF4-FFF2-40B4-BE49-F238E27FC236}">
+                <a16:creationId xmlns:a16="http://schemas.microsoft.com/office/drawing/2014/main" id="{4FA25C42-61E5-432F-9B59-86E7E569413B}"/>
+              </a:ext>
+            </a:extLst>
+          </p:cNvPr>
+          <p:cNvSpPr/>
+          <p:nvPr/>
+        </p:nvSpPr>
+        <p:spPr>
+          <a:xfrm>
+            <a:off x="3536731" y="3095296"/>
+            <a:ext cx="6096000" cy="646331"/>
+          </a:xfrm>
+          <a:prstGeom prst="rect">
+            <a:avLst/>
+          </a:prstGeom>
+        </p:spPr>
+        <p:txBody>
+          <a:bodyPr>
+            <a:spAutoFit/>
+          </a:bodyPr>
+          <a:lstStyle/>
+          <a:p>
+            <a:pPr algn="ctr"/>
+            <a:r>
+              <a:rPr lang="en-US" b="1" dirty="0">
+                <a:solidFill>
+                  <a:schemeClr val="tx2">
+                    <a:lumMod val="20000"/>
+                    <a:lumOff val="80000"/>
+                  </a:schemeClr>
+                </a:solidFill>
+                <a:latin typeface="Calibri" panose="020F0502020204030204" pitchFamily="34" charset="0"/>
+                <a:ea typeface="Calibri" panose="020F0502020204030204" pitchFamily="34" charset="0"/>
+                <a:cs typeface="Times New Roman" panose="02020603050405020304" pitchFamily="18" charset="0"/>
+              </a:rPr>
+              <a:t>Business Owner: </a:t>
+            </a:r>
+            <a:r>
+              <a:rPr lang="en-US" b="1" dirty="0" err="1">
+                <a:solidFill>
+                  <a:schemeClr val="tx2">
+                    <a:lumMod val="20000"/>
+                    <a:lumOff val="80000"/>
+                  </a:schemeClr>
+                </a:solidFill>
+                <a:latin typeface="Calibri" panose="020F0502020204030204" pitchFamily="34" charset="0"/>
+                <a:ea typeface="Calibri" panose="020F0502020204030204" pitchFamily="34" charset="0"/>
+                <a:cs typeface="Times New Roman" panose="02020603050405020304" pitchFamily="18" charset="0"/>
+              </a:rPr>
+              <a:t>Figgy</a:t>
+            </a:r>
+            <a:r>
+              <a:rPr lang="en-US" b="1" dirty="0">
+                <a:solidFill>
+                  <a:schemeClr val="tx2">
+                    <a:lumMod val="20000"/>
+                    <a:lumOff val="80000"/>
+                  </a:schemeClr>
+                </a:solidFill>
+                <a:latin typeface="Calibri" panose="020F0502020204030204" pitchFamily="34" charset="0"/>
+                <a:ea typeface="Calibri" panose="020F0502020204030204" pitchFamily="34" charset="0"/>
+                <a:cs typeface="Times New Roman" panose="02020603050405020304" pitchFamily="18" charset="0"/>
+              </a:rPr>
+              <a:t> Z, of XYZ Audio.                          Information Security Graduate Project</a:t>
+            </a:r>
+            <a:endParaRPr lang="en-US" dirty="0">
+              <a:solidFill>
+                <a:schemeClr val="tx2">
+                  <a:lumMod val="20000"/>
+                  <a:lumOff val="80000"/>
+                </a:schemeClr>
+              </a:solidFill>
+            </a:endParaRPr>
           </a:p>
         </p:txBody>
       </p:sp>

</xml_diff>